<commit_message>
final checkin for brownbag
</commit_message>
<xml_diff>
--- a/brownbag/jamine/tech-presentation-jasmine.pptx
+++ b/brownbag/jamine/tech-presentation-jasmine.pptx
@@ -129,7 +129,7 @@
   </p:defaultTextStyle>
   <p:extLst>
     <p:ext uri="{EFAFB233-063F-42B5-8137-9DF3F51BA10A}">
-      <p15:sldGuideLst xmlns:p15="http://schemas.microsoft.com/office/powerpoint/2012/main">
+      <p15:sldGuideLst xmlns:p15="http://schemas.microsoft.com/office/powerpoint/2012/main" xmlns="">
         <p15:guide id="1" orient="horz" pos="2160">
           <p15:clr>
             <a:srgbClr val="A4A3A4"/>
@@ -228,7 +228,7 @@
           <a:p>
             <a:fld id="{436134EC-835B-48D8-BDB5-96D4A8A8ACE7}" type="datetimeFigureOut">
               <a:rPr lang="en-US" smtClean="0"/>
-              <a:t>11/9/2015</a:t>
+              <a:t>11/20/2015</a:t>
             </a:fld>
             <a:endParaRPr lang="en-US"/>
           </a:p>
@@ -864,7 +864,7 @@
           <a:p>
             <a:fld id="{216C5678-EE20-4FA5-88E2-6E0BD67A2E26}" type="datetime1">
               <a:rPr lang="en-US" smtClean="0"/>
-              <a:t>11/9/2015</a:t>
+              <a:t>11/20/2015</a:t>
             </a:fld>
             <a:endParaRPr lang="en-US" dirty="0"/>
           </a:p>
@@ -1034,7 +1034,7 @@
           <a:p>
             <a:fld id="{EA051B39-B140-43FE-96DB-472A2B59CE7C}" type="datetime1">
               <a:rPr lang="en-US" smtClean="0"/>
-              <a:t>11/9/2015</a:t>
+              <a:t>11/20/2015</a:t>
             </a:fld>
             <a:endParaRPr lang="en-US"/>
           </a:p>
@@ -1214,7 +1214,7 @@
           <a:p>
             <a:fld id="{DA600BB2-27C5-458B-ABCE-839C88CF47CE}" type="datetime1">
               <a:rPr lang="en-US" smtClean="0"/>
-              <a:t>11/9/2015</a:t>
+              <a:t>11/20/2015</a:t>
             </a:fld>
             <a:endParaRPr lang="en-US"/>
           </a:p>
@@ -1402,7 +1402,7 @@
           <a:p>
             <a:fld id="{B11D738E-8962-435F-8C43-147B8DD7E819}" type="datetime1">
               <a:rPr lang="en-US" smtClean="0"/>
-              <a:t>11/9/2015</a:t>
+              <a:t>11/20/2015</a:t>
             </a:fld>
             <a:endParaRPr lang="en-US"/>
           </a:p>
@@ -1669,7 +1669,7 @@
           <a:p>
             <a:fld id="{09CAEA93-55E7-4DA9-90C2-089A26EEFEC4}" type="datetime1">
               <a:rPr lang="en-US" smtClean="0"/>
-              <a:t>11/9/2015</a:t>
+              <a:t>11/20/2015</a:t>
             </a:fld>
             <a:endParaRPr lang="en-US"/>
           </a:p>
@@ -2022,7 +2022,7 @@
           <a:p>
             <a:fld id="{E34CF3C7-6809-4F39-BD67-A75817BDDE0A}" type="datetime1">
               <a:rPr lang="en-US" smtClean="0"/>
-              <a:t>11/9/2015</a:t>
+              <a:t>11/20/2015</a:t>
             </a:fld>
             <a:endParaRPr lang="en-US"/>
           </a:p>
@@ -2335,7 +2335,7 @@
           <a:p>
             <a:fld id="{F7EAEB24-CE78-465C-A726-91D0868FA48F}" type="datetime1">
               <a:rPr lang="en-US" smtClean="0"/>
-              <a:t>11/9/2015</a:t>
+              <a:t>11/20/2015</a:t>
             </a:fld>
             <a:endParaRPr lang="en-US"/>
           </a:p>
@@ -2567,7 +2567,7 @@
           <a:p>
             <a:fld id="{40BAADF0-1749-4E8B-9691-B44A5F8C0895}" type="datetime1">
               <a:rPr lang="en-US" smtClean="0"/>
-              <a:t>11/9/2015</a:t>
+              <a:t>11/20/2015</a:t>
             </a:fld>
             <a:endParaRPr lang="en-US"/>
           </a:p>
@@ -2662,7 +2662,7 @@
           <a:p>
             <a:fld id="{A8AF628A-A867-4937-BBE5-207DB6F9C51A}" type="datetime1">
               <a:rPr lang="en-US" smtClean="0"/>
-              <a:t>11/9/2015</a:t>
+              <a:t>11/20/2015</a:t>
             </a:fld>
             <a:endParaRPr lang="en-US"/>
           </a:p>
@@ -2955,7 +2955,7 @@
           <a:p>
             <a:fld id="{118BBB94-68E6-4675-A946-F1C5994EDBD7}" type="datetime1">
               <a:rPr lang="en-US" smtClean="0"/>
-              <a:t>11/9/2015</a:t>
+              <a:t>11/20/2015</a:t>
             </a:fld>
             <a:endParaRPr lang="en-US"/>
           </a:p>
@@ -3229,7 +3229,7 @@
           <a:p>
             <a:fld id="{DC3B8377-21E3-4835-B75D-4E2847E2750F}" type="datetime1">
               <a:rPr lang="en-US" smtClean="0"/>
-              <a:t>11/9/2015</a:t>
+              <a:t>11/20/2015</a:t>
             </a:fld>
             <a:endParaRPr lang="en-US"/>
           </a:p>
@@ -3444,7 +3444,7 @@
           <a:p>
             <a:fld id="{B0C4986D-6BE9-4264-908F-02DB36FD8D6C}" type="datetime1">
               <a:rPr lang="en-US" smtClean="0"/>
-              <a:t>11/9/2015</a:t>
+              <a:t>11/20/2015</a:t>
             </a:fld>
             <a:endParaRPr lang="en-US" dirty="0"/>
           </a:p>
@@ -4054,7 +4054,7 @@
           <a:p>
             <a:fld id="{216C5678-EE20-4FA5-88E2-6E0BD67A2E26}" type="datetime1">
               <a:rPr lang="en-US" smtClean="0"/>
-              <a:t>11/9/2015</a:t>
+              <a:t>11/20/2015</a:t>
             </a:fld>
             <a:endParaRPr lang="en-US" dirty="0"/>
           </a:p>
@@ -4183,7 +4183,7 @@
           <a:p>
             <a:fld id="{216C5678-EE20-4FA5-88E2-6E0BD67A2E26}" type="datetime1">
               <a:rPr lang="en-US" smtClean="0"/>
-              <a:t>11/9/2015</a:t>
+              <a:t>11/20/2015</a:t>
             </a:fld>
             <a:endParaRPr lang="en-US" dirty="0"/>
           </a:p>
@@ -4344,7 +4344,7 @@
           <a:p>
             <a:fld id="{216C5678-EE20-4FA5-88E2-6E0BD67A2E26}" type="datetime1">
               <a:rPr lang="en-US" smtClean="0"/>
-              <a:t>11/9/2015</a:t>
+              <a:t>11/20/2015</a:t>
             </a:fld>
             <a:endParaRPr lang="en-US" dirty="0"/>
           </a:p>
@@ -4452,7 +4452,15 @@
             <a:pPr algn="l"/>
             <a:r>
               <a:rPr lang="en-US" dirty="0" smtClean="0"/>
-              <a:t>     if( “should… “, function(</a:t>
+              <a:t>     if( “</a:t>
+            </a:r>
+            <a:r>
+              <a:rPr lang="en-US" dirty="0" smtClean="0"/>
+              <a:t>should… </a:t>
+            </a:r>
+            <a:r>
+              <a:rPr lang="en-US" dirty="0" smtClean="0"/>
+              <a:t>“, function(</a:t>
             </a:r>
             <a:r>
               <a:rPr lang="en-US" dirty="0" err="1" smtClean="0"/>
@@ -4467,7 +4475,15 @@
             <a:pPr algn="l"/>
             <a:r>
               <a:rPr lang="en-US" dirty="0" smtClean="0"/>
-              <a:t>         // execute </a:t>
+              <a:t>         </a:t>
+            </a:r>
+            <a:r>
+              <a:rPr lang="en-US" dirty="0" smtClean="0"/>
+              <a:t>            // </a:t>
+            </a:r>
+            <a:r>
+              <a:rPr lang="en-US" dirty="0" smtClean="0"/>
+              <a:t>execute </a:t>
             </a:r>
             <a:r>
               <a:rPr lang="en-US" dirty="0" err="1" smtClean="0"/>
@@ -4489,13 +4505,10 @@
               <a:t>        </a:t>
             </a:r>
             <a:r>
-              <a:rPr lang="en-US" dirty="0" err="1" smtClean="0"/>
-              <a:t>doneCallback</a:t>
-            </a:r>
-            <a:r>
               <a:rPr lang="en-US" dirty="0" smtClean="0"/>
-              <a:t>();</a:t>
-            </a:r>
+              <a:t>            done ();</a:t>
+            </a:r>
+            <a:endParaRPr lang="en-US" dirty="0" smtClean="0"/>
           </a:p>
           <a:p>
             <a:pPr algn="l"/>
@@ -4543,7 +4556,15 @@
             <a:pPr algn="l"/>
             <a:r>
               <a:rPr lang="en-US" dirty="0"/>
-              <a:t>         // execute </a:t>
+              <a:t>         </a:t>
+            </a:r>
+            <a:r>
+              <a:rPr lang="en-US" dirty="0" smtClean="0"/>
+              <a:t>              // </a:t>
+            </a:r>
+            <a:r>
+              <a:rPr lang="en-US" dirty="0"/>
+              <a:t>execute </a:t>
             </a:r>
             <a:r>
               <a:rPr lang="en-US" dirty="0" err="1"/>
@@ -4561,13 +4582,10 @@
               <a:t>         </a:t>
             </a:r>
             <a:r>
-              <a:rPr lang="en-US" dirty="0" err="1"/>
-              <a:t>doneCallback</a:t>
-            </a:r>
-            <a:r>
-              <a:rPr lang="en-US" dirty="0"/>
-              <a:t>();</a:t>
-            </a:r>
+              <a:rPr lang="en-US" dirty="0" smtClean="0"/>
+              <a:t>              done ();</a:t>
+            </a:r>
+            <a:endParaRPr lang="en-US" dirty="0"/>
           </a:p>
           <a:p>
             <a:pPr algn="l"/>
@@ -4674,7 +4692,7 @@
           <a:p>
             <a:fld id="{216C5678-EE20-4FA5-88E2-6E0BD67A2E26}" type="datetime1">
               <a:rPr lang="en-US" smtClean="0"/>
-              <a:t>11/9/2015</a:t>
+              <a:t>11/20/2015</a:t>
             </a:fld>
             <a:endParaRPr lang="en-US" dirty="0"/>
           </a:p>
@@ -4772,10 +4790,18 @@
           </a:p>
           <a:p>
             <a:r>
-              <a:rPr lang="en-US" dirty="0" smtClean="0"/>
-              <a:t>code demo</a:t>
-            </a:r>
-            <a:endParaRPr lang="en-US" dirty="0"/>
+              <a:rPr lang="en-US" b="1" dirty="0"/>
+              <a:t>C</a:t>
+            </a:r>
+            <a:r>
+              <a:rPr lang="en-US" b="1" dirty="0" smtClean="0"/>
+              <a:t>ode </a:t>
+            </a:r>
+            <a:r>
+              <a:rPr lang="en-US" b="1" dirty="0" smtClean="0"/>
+              <a:t>demo</a:t>
+            </a:r>
+            <a:endParaRPr lang="en-US" b="1" dirty="0"/>
           </a:p>
         </p:txBody>
       </p:sp>
@@ -4859,7 +4885,7 @@
           <a:p>
             <a:fld id="{216C5678-EE20-4FA5-88E2-6E0BD67A2E26}" type="datetime1">
               <a:rPr lang="en-US" smtClean="0"/>
-              <a:t>11/9/2015</a:t>
+              <a:t>11/20/2015</a:t>
             </a:fld>
             <a:endParaRPr lang="en-US" dirty="0"/>
           </a:p>
@@ -5239,7 +5265,7 @@
           <a:p>
             <a:fld id="{216C5678-EE20-4FA5-88E2-6E0BD67A2E26}" type="datetime1">
               <a:rPr lang="en-US" smtClean="0"/>
-              <a:t>11/9/2015</a:t>
+              <a:t>11/20/2015</a:t>
             </a:fld>
             <a:endParaRPr lang="en-US" dirty="0"/>
           </a:p>
@@ -5461,7 +5487,7 @@
           <a:p>
             <a:fld id="{216C5678-EE20-4FA5-88E2-6E0BD67A2E26}" type="datetime1">
               <a:rPr lang="en-US" smtClean="0"/>
-              <a:t>11/9/2015</a:t>
+              <a:t>11/20/2015</a:t>
             </a:fld>
             <a:endParaRPr lang="en-US" dirty="0"/>
           </a:p>
@@ -5580,8 +5606,8 @@
         </p:blipFill>
         <p:spPr>
           <a:xfrm>
-            <a:off x="1295400" y="2110662"/>
-            <a:ext cx="7425654" cy="4240608"/>
+            <a:off x="762000" y="1806050"/>
+            <a:ext cx="7959054" cy="4545220"/>
           </a:xfrm>
           <a:prstGeom prst="rect">
             <a:avLst/>
@@ -5676,7 +5702,7 @@
           <a:p>
             <a:fld id="{216C5678-EE20-4FA5-88E2-6E0BD67A2E26}" type="datetime1">
               <a:rPr lang="en-US" smtClean="0"/>
-              <a:t>11/9/2015</a:t>
+              <a:t>11/20/2015</a:t>
             </a:fld>
             <a:endParaRPr lang="en-US" dirty="0"/>
           </a:p>
@@ -5907,10 +5933,10 @@
           </a:lstStyle>
           <a:p>
             <a:r>
-              <a:rPr lang="en-US" dirty="0" smtClean="0"/>
+              <a:rPr lang="en-US" b="1" dirty="0" smtClean="0"/>
               <a:t>Code Demo</a:t>
             </a:r>
-            <a:endParaRPr lang="en-US" dirty="0"/>
+            <a:endParaRPr lang="en-US" b="1" dirty="0"/>
           </a:p>
         </p:txBody>
       </p:sp>
@@ -5967,11 +5993,7 @@
             <a:pPr algn="l"/>
             <a:r>
               <a:rPr lang="en-US" sz="4000" dirty="0" smtClean="0"/>
-              <a:t>Unit Testing </a:t>
-            </a:r>
-            <a:r>
-              <a:rPr lang="en-US" sz="4000" dirty="0" smtClean="0"/>
-              <a:t>with DOM Element</a:t>
+              <a:t>Unit Testing with DOM Element</a:t>
             </a:r>
             <a:endParaRPr lang="en-US" sz="4000" dirty="0"/>
           </a:p>
@@ -5994,7 +6016,7 @@
           <a:p>
             <a:fld id="{216C5678-EE20-4FA5-88E2-6E0BD67A2E26}" type="datetime1">
               <a:rPr lang="en-US" smtClean="0"/>
-              <a:t>11/9/2015</a:t>
+              <a:t>11/20/2015</a:t>
             </a:fld>
             <a:endParaRPr lang="en-US" dirty="0"/>
           </a:p>
@@ -6139,10 +6161,10 @@
           </a:p>
           <a:p>
             <a:r>
-              <a:rPr lang="en-US" dirty="0" smtClean="0"/>
+              <a:rPr lang="en-US" b="1" dirty="0" smtClean="0"/>
               <a:t>Code Demo</a:t>
             </a:r>
-            <a:endParaRPr lang="en-US" dirty="0"/>
+            <a:endParaRPr lang="en-US" b="1" dirty="0"/>
           </a:p>
         </p:txBody>
       </p:sp>
@@ -6246,7 +6268,7 @@
           <a:p>
             <a:fld id="{216C5678-EE20-4FA5-88E2-6E0BD67A2E26}" type="datetime1">
               <a:rPr lang="en-US" smtClean="0"/>
-              <a:t>11/9/2015</a:t>
+              <a:t>11/20/2015</a:t>
             </a:fld>
             <a:endParaRPr lang="en-US" dirty="0"/>
           </a:p>
@@ -6631,7 +6653,7 @@
           <a:p>
             <a:fld id="{216C5678-EE20-4FA5-88E2-6E0BD67A2E26}" type="datetime1">
               <a:rPr lang="en-US" smtClean="0"/>
-              <a:t>11/9/2015</a:t>
+              <a:t>11/20/2015</a:t>
             </a:fld>
             <a:endParaRPr lang="en-US" dirty="0"/>
           </a:p>
@@ -6979,7 +7001,7 @@
         </p:nvSpPr>
         <p:spPr>
           <a:xfrm>
-            <a:off x="1219200" y="1219200"/>
+            <a:off x="762000" y="1219200"/>
             <a:ext cx="7315200" cy="4343400"/>
           </a:xfrm>
         </p:spPr>
@@ -7013,8 +7035,9 @@
             </a:r>
             <a:r>
               <a:rPr lang="en-US" sz="3200" dirty="0" smtClean="0"/>
-              <a:t> Jasmine.</a:t>
-            </a:r>
+              <a:t>.</a:t>
+            </a:r>
+            <a:endParaRPr lang="en-US" sz="3200" dirty="0" smtClean="0"/>
           </a:p>
           <a:p>
             <a:pPr marL="342900" indent="-342900" algn="l">
@@ -7112,7 +7135,7 @@
           <a:p>
             <a:fld id="{216C5678-EE20-4FA5-88E2-6E0BD67A2E26}" type="datetime1">
               <a:rPr lang="en-US" smtClean="0"/>
-              <a:t>11/9/2015</a:t>
+              <a:t>11/20/2015</a:t>
             </a:fld>
             <a:endParaRPr lang="en-US" dirty="0"/>
           </a:p>
@@ -7241,7 +7264,7 @@
           <a:p>
             <a:fld id="{216C5678-EE20-4FA5-88E2-6E0BD67A2E26}" type="datetime1">
               <a:rPr lang="en-US" smtClean="0"/>
-              <a:t>11/9/2015</a:t>
+              <a:t>11/20/2015</a:t>
             </a:fld>
             <a:endParaRPr lang="en-US" dirty="0"/>
           </a:p>
@@ -7485,15 +7508,7 @@
             </a:r>
             <a:r>
               <a:rPr lang="en-US" dirty="0" smtClean="0"/>
-              <a:t> </a:t>
-            </a:r>
-            <a:r>
-              <a:rPr lang="en-US" dirty="0" smtClean="0"/>
-              <a:t>   </a:t>
-            </a:r>
-            <a:r>
-              <a:rPr lang="en-US" dirty="0" smtClean="0"/>
-              <a:t>to generate karma.conf.js</a:t>
+              <a:t>    to generate karma.conf.js</a:t>
             </a:r>
           </a:p>
           <a:p>
@@ -7528,9 +7543,13 @@
             </a:r>
             <a:r>
               <a:rPr lang="en-US" dirty="0" smtClean="0"/>
-              <a:t>		Code Demo</a:t>
-            </a:r>
-            <a:endParaRPr lang="en-US" dirty="0"/>
+              <a:t>		</a:t>
+            </a:r>
+            <a:r>
+              <a:rPr lang="en-US" b="1" dirty="0" smtClean="0"/>
+              <a:t>Code Demo</a:t>
+            </a:r>
+            <a:endParaRPr lang="en-US" b="1" dirty="0"/>
           </a:p>
         </p:txBody>
       </p:sp>
@@ -7610,7 +7629,7 @@
           <a:p>
             <a:fld id="{216C5678-EE20-4FA5-88E2-6E0BD67A2E26}" type="datetime1">
               <a:rPr lang="en-US" smtClean="0"/>
-              <a:t>11/9/2015</a:t>
+              <a:t>11/20/2015</a:t>
             </a:fld>
             <a:endParaRPr lang="en-US" dirty="0"/>
           </a:p>
@@ -7964,7 +7983,7 @@
           <a:p>
             <a:fld id="{216C5678-EE20-4FA5-88E2-6E0BD67A2E26}" type="datetime1">
               <a:rPr lang="en-US" smtClean="0"/>
-              <a:t>11/9/2015</a:t>
+              <a:t>11/20/2015</a:t>
             </a:fld>
             <a:endParaRPr lang="en-US" dirty="0"/>
           </a:p>
@@ -8070,8 +8089,12 @@
               <a:buChar char="•"/>
             </a:pPr>
             <a:r>
+              <a:rPr lang="en-US" dirty="0" smtClean="0"/>
+              <a:t>Used </a:t>
+            </a:r>
+            <a:r>
               <a:rPr lang="en-US" dirty="0"/>
-              <a:t>Use for white-box testing</a:t>
+              <a:t>for white-box testing</a:t>
             </a:r>
             <a:r>
               <a:rPr lang="en-US" dirty="0" smtClean="0"/>
@@ -8190,7 +8213,7 @@
           <a:p>
             <a:fld id="{216C5678-EE20-4FA5-88E2-6E0BD67A2E26}" type="datetime1">
               <a:rPr lang="en-US" smtClean="0"/>
-              <a:t>11/9/2015</a:t>
+              <a:t>11/20/2015</a:t>
             </a:fld>
             <a:endParaRPr lang="en-US" dirty="0"/>
           </a:p>
@@ -8411,7 +8434,7 @@
           <a:p>
             <a:fld id="{216C5678-EE20-4FA5-88E2-6E0BD67A2E26}" type="datetime1">
               <a:rPr lang="en-US" smtClean="0"/>
-              <a:t>11/9/2015</a:t>
+              <a:t>11/20/2015</a:t>
             </a:fld>
             <a:endParaRPr lang="en-US" dirty="0"/>
           </a:p>
@@ -8700,7 +8723,7 @@
           <a:p>
             <a:fld id="{216C5678-EE20-4FA5-88E2-6E0BD67A2E26}" type="datetime1">
               <a:rPr lang="en-US" smtClean="0"/>
-              <a:t>11/9/2015</a:t>
+              <a:t>11/20/2015</a:t>
             </a:fld>
             <a:endParaRPr lang="en-US" dirty="0"/>
           </a:p>
@@ -9122,7 +9145,7 @@
           <a:p>
             <a:fld id="{216C5678-EE20-4FA5-88E2-6E0BD67A2E26}" type="datetime1">
               <a:rPr lang="en-US" smtClean="0"/>
-              <a:t>11/9/2015</a:t>
+              <a:t>11/20/2015</a:t>
             </a:fld>
             <a:endParaRPr lang="en-US" dirty="0"/>
           </a:p>
@@ -10003,7 +10026,7 @@
           <a:p>
             <a:fld id="{216C5678-EE20-4FA5-88E2-6E0BD67A2E26}" type="datetime1">
               <a:rPr lang="en-US" smtClean="0"/>
-              <a:t>11/9/2015</a:t>
+              <a:t>11/20/2015</a:t>
             </a:fld>
             <a:endParaRPr lang="en-US" dirty="0"/>
           </a:p>
@@ -10406,7 +10429,7 @@
           <a:p>
             <a:fld id="{216C5678-EE20-4FA5-88E2-6E0BD67A2E26}" type="datetime1">
               <a:rPr lang="en-US" smtClean="0"/>
-              <a:t>11/9/2015</a:t>
+              <a:t>11/20/2015</a:t>
             </a:fld>
             <a:endParaRPr lang="en-US" dirty="0"/>
           </a:p>
@@ -10604,6 +10627,26 @@
               <a:rPr lang="en-US" sz="2000" dirty="0"/>
               <a:t> 	= function(x, y) </a:t>
             </a:r>
+            <a:endParaRPr lang="en-US" sz="2000" dirty="0" smtClean="0"/>
+          </a:p>
+          <a:p>
+            <a:pPr algn="l"/>
+            <a:r>
+              <a:rPr lang="en-US" sz="2000" dirty="0" err="1" smtClean="0"/>
+              <a:t>Calculator.prototype.divide</a:t>
+            </a:r>
+            <a:r>
+              <a:rPr lang="en-US" sz="2000" dirty="0" smtClean="0"/>
+              <a:t>                 </a:t>
+            </a:r>
+            <a:r>
+              <a:rPr lang="en-US" sz="2000" dirty="0"/>
+              <a:t>= function(x, y) </a:t>
+            </a:r>
+          </a:p>
+          <a:p>
+            <a:pPr algn="l"/>
+            <a:endParaRPr lang="en-US" sz="2000" dirty="0"/>
           </a:p>
         </p:txBody>
       </p:sp>

</xml_diff>